<commit_message>
more cleanup and powerpoint direction
</commit_message>
<xml_diff>
--- a/PresentationSoftEng.pptx
+++ b/PresentationSoftEng.pptx
@@ -7,10 +7,12 @@
   <p:sldIdLst>
     <p:sldId id="256" r:id="rId2"/>
     <p:sldId id="257" r:id="rId3"/>
-    <p:sldId id="258" r:id="rId4"/>
-    <p:sldId id="259" r:id="rId5"/>
-    <p:sldId id="260" r:id="rId6"/>
-    <p:sldId id="261" r:id="rId7"/>
+    <p:sldId id="262" r:id="rId4"/>
+    <p:sldId id="258" r:id="rId5"/>
+    <p:sldId id="259" r:id="rId6"/>
+    <p:sldId id="260" r:id="rId7"/>
+    <p:sldId id="263" r:id="rId8"/>
+    <p:sldId id="261" r:id="rId9"/>
   </p:sldIdLst>
   <p:sldSz cx="9144000" cy="6858000" type="screen4x3"/>
   <p:notesSz cx="6858000" cy="9144000"/>
@@ -109,6 +111,22 @@
       </a:defRPr>
     </a:lvl9pPr>
   </p:defaultTextStyle>
+  <p:extLst>
+    <p:ext uri="{EFAFB233-063F-42B5-8137-9DF3F51BA10A}">
+      <p15:sldGuideLst xmlns:p15="http://schemas.microsoft.com/office/powerpoint/2012/main">
+        <p15:guide id="1" orient="horz" pos="2160">
+          <p15:clr>
+            <a:srgbClr val="A4A3A4"/>
+          </p15:clr>
+        </p15:guide>
+        <p15:guide id="2" pos="2880">
+          <p15:clr>
+            <a:srgbClr val="A4A3A4"/>
+          </p15:clr>
+        </p15:guide>
+      </p15:sldGuideLst>
+    </p:ext>
+  </p:extLst>
 </p:presentation>
 </file>
 
@@ -409,7 +427,7 @@
           </a:lstStyle>
           <a:p>
             <a:r>
-              <a:rPr lang="en-US" smtClean="0"/>
+              <a:rPr lang="en-US"/>
               <a:t>Click to edit Master title style</a:t>
             </a:r>
             <a:endParaRPr lang="en-US" dirty="0"/>
@@ -556,7 +574,7 @@
               <a:defRPr/>
             </a:pPr>
             <a:r>
-              <a:rPr lang="en-US" smtClean="0"/>
+              <a:rPr lang="en-US"/>
               <a:t>Click to edit Master subtitle style</a:t>
             </a:r>
             <a:endParaRPr lang="en-US" dirty="0"/>
@@ -581,7 +599,7 @@
             <a:fld id="{7D0065BE-0657-4A47-90AD-C21C55E16B19}" type="datetime4">
               <a:rPr lang="en-US" smtClean="0"/>
               <a:pPr/>
-              <a:t>September 27, 2016</a:t>
+              <a:t>September 28, 2016</a:t>
             </a:fld>
             <a:endParaRPr lang="en-US"/>
           </a:p>
@@ -671,10 +689,9 @@
           <a:lstStyle/>
           <a:p>
             <a:r>
-              <a:rPr lang="en-US" smtClean="0"/>
+              <a:rPr lang="en-US"/>
               <a:t>Click to edit Master title style</a:t>
             </a:r>
-            <a:endParaRPr lang="en-US"/>
           </a:p>
         </p:txBody>
       </p:sp>
@@ -695,38 +712,37 @@
           <a:p>
             <a:pPr lvl="0"/>
             <a:r>
-              <a:rPr lang="en-US" smtClean="0"/>
+              <a:rPr lang="en-US"/>
               <a:t>Click to edit Master text styles</a:t>
             </a:r>
           </a:p>
           <a:p>
             <a:pPr lvl="1"/>
             <a:r>
-              <a:rPr lang="en-US" smtClean="0"/>
+              <a:rPr lang="en-US"/>
               <a:t>Second level</a:t>
             </a:r>
           </a:p>
           <a:p>
             <a:pPr lvl="2"/>
             <a:r>
-              <a:rPr lang="en-US" smtClean="0"/>
+              <a:rPr lang="en-US"/>
               <a:t>Third level</a:t>
             </a:r>
           </a:p>
           <a:p>
             <a:pPr lvl="3"/>
             <a:r>
-              <a:rPr lang="en-US" smtClean="0"/>
+              <a:rPr lang="en-US"/>
               <a:t>Fourth level</a:t>
             </a:r>
           </a:p>
           <a:p>
             <a:pPr lvl="4"/>
             <a:r>
-              <a:rPr lang="en-US" smtClean="0"/>
+              <a:rPr lang="en-US"/>
               <a:t>Fifth level</a:t>
             </a:r>
-            <a:endParaRPr lang="en-US"/>
           </a:p>
         </p:txBody>
       </p:sp>
@@ -748,7 +764,7 @@
             <a:fld id="{A16C3AA4-67BE-44F7-809A-3582401494AF}" type="datetime4">
               <a:rPr lang="en-US" smtClean="0"/>
               <a:pPr/>
-              <a:t>September 27, 2016</a:t>
+              <a:t>September 28, 2016</a:t>
             </a:fld>
             <a:endParaRPr lang="en-US"/>
           </a:p>
@@ -843,7 +859,7 @@
           <a:lstStyle/>
           <a:p>
             <a:r>
-              <a:rPr lang="en-US" smtClean="0"/>
+              <a:rPr lang="en-US"/>
               <a:t>Click to edit Master title style</a:t>
             </a:r>
             <a:endParaRPr lang="en-US" dirty="0"/>
@@ -872,38 +888,37 @@
           <a:p>
             <a:pPr lvl="0"/>
             <a:r>
-              <a:rPr lang="en-US" smtClean="0"/>
+              <a:rPr lang="en-US"/>
               <a:t>Click to edit Master text styles</a:t>
             </a:r>
           </a:p>
           <a:p>
             <a:pPr lvl="1"/>
             <a:r>
-              <a:rPr lang="en-US" smtClean="0"/>
+              <a:rPr lang="en-US"/>
               <a:t>Second level</a:t>
             </a:r>
           </a:p>
           <a:p>
             <a:pPr lvl="2"/>
             <a:r>
-              <a:rPr lang="en-US" smtClean="0"/>
+              <a:rPr lang="en-US"/>
               <a:t>Third level</a:t>
             </a:r>
           </a:p>
           <a:p>
             <a:pPr lvl="3"/>
             <a:r>
-              <a:rPr lang="en-US" smtClean="0"/>
+              <a:rPr lang="en-US"/>
               <a:t>Fourth level</a:t>
             </a:r>
           </a:p>
           <a:p>
             <a:pPr lvl="4"/>
             <a:r>
-              <a:rPr lang="en-US" smtClean="0"/>
+              <a:rPr lang="en-US"/>
               <a:t>Fifth level</a:t>
             </a:r>
-            <a:endParaRPr lang="en-US"/>
           </a:p>
         </p:txBody>
       </p:sp>
@@ -925,7 +940,7 @@
             <a:fld id="{25172EEB-1769-4776-AD69-E7C1260563EB}" type="datetime4">
               <a:rPr lang="en-US" smtClean="0"/>
               <a:pPr/>
-              <a:t>September 27, 2016</a:t>
+              <a:t>September 28, 2016</a:t>
             </a:fld>
             <a:endParaRPr lang="en-US"/>
           </a:p>
@@ -1015,10 +1030,9 @@
           <a:lstStyle/>
           <a:p>
             <a:r>
-              <a:rPr lang="en-US" smtClean="0"/>
+              <a:rPr lang="en-US"/>
               <a:t>Click to edit Master title style</a:t>
             </a:r>
-            <a:endParaRPr lang="en-US"/>
           </a:p>
         </p:txBody>
       </p:sp>
@@ -1039,35 +1053,35 @@
           <a:p>
             <a:pPr lvl="0"/>
             <a:r>
-              <a:rPr lang="en-US" smtClean="0"/>
+              <a:rPr lang="en-US"/>
               <a:t>Click to edit Master text styles</a:t>
             </a:r>
           </a:p>
           <a:p>
             <a:pPr lvl="1"/>
             <a:r>
-              <a:rPr lang="en-US" smtClean="0"/>
+              <a:rPr lang="en-US"/>
               <a:t>Second level</a:t>
             </a:r>
           </a:p>
           <a:p>
             <a:pPr lvl="2"/>
             <a:r>
-              <a:rPr lang="en-US" smtClean="0"/>
+              <a:rPr lang="en-US"/>
               <a:t>Third level</a:t>
             </a:r>
           </a:p>
           <a:p>
             <a:pPr lvl="3"/>
             <a:r>
-              <a:rPr lang="en-US" smtClean="0"/>
+              <a:rPr lang="en-US"/>
               <a:t>Fourth level</a:t>
             </a:r>
           </a:p>
           <a:p>
             <a:pPr lvl="4"/>
             <a:r>
-              <a:rPr lang="en-US" smtClean="0"/>
+              <a:rPr lang="en-US"/>
               <a:t>Fifth level</a:t>
             </a:r>
             <a:endParaRPr lang="en-US" dirty="0"/>
@@ -1092,7 +1106,7 @@
             <a:fld id="{D47BB8AF-C16A-4836-A92D-61834B5F0BA5}" type="datetime4">
               <a:rPr lang="en-US" smtClean="0"/>
               <a:pPr/>
-              <a:t>September 27, 2016</a:t>
+              <a:t>September 28, 2016</a:t>
             </a:fld>
             <a:endParaRPr lang="en-US"/>
           </a:p>
@@ -1476,7 +1490,7 @@
               <a:defRPr/>
             </a:pPr>
             <a:r>
-              <a:rPr lang="en-US" smtClean="0"/>
+              <a:rPr lang="en-US"/>
               <a:t>Click to edit Master title style</a:t>
             </a:r>
             <a:endParaRPr lang="en-US" dirty="0"/>
@@ -1623,7 +1637,7 @@
               <a:defRPr/>
             </a:pPr>
             <a:r>
-              <a:rPr lang="en-US" smtClean="0"/>
+              <a:rPr lang="en-US"/>
               <a:t>Click to edit Master text styles</a:t>
             </a:r>
           </a:p>
@@ -1647,7 +1661,7 @@
             <a:fld id="{647D2193-4505-4A75-99BB-880C6989A757}" type="datetime4">
               <a:rPr lang="en-US" smtClean="0"/>
               <a:pPr/>
-              <a:t>September 27, 2016</a:t>
+              <a:t>September 28, 2016</a:t>
             </a:fld>
             <a:endParaRPr lang="en-US"/>
           </a:p>
@@ -1771,35 +1785,35 @@
           <a:p>
             <a:pPr lvl="0"/>
             <a:r>
-              <a:rPr lang="en-US" smtClean="0"/>
+              <a:rPr lang="en-US"/>
               <a:t>Click to edit Master text styles</a:t>
             </a:r>
           </a:p>
           <a:p>
             <a:pPr lvl="1"/>
             <a:r>
-              <a:rPr lang="en-US" smtClean="0"/>
+              <a:rPr lang="en-US"/>
               <a:t>Second level</a:t>
             </a:r>
           </a:p>
           <a:p>
             <a:pPr lvl="2"/>
             <a:r>
-              <a:rPr lang="en-US" smtClean="0"/>
+              <a:rPr lang="en-US"/>
               <a:t>Third level</a:t>
             </a:r>
           </a:p>
           <a:p>
             <a:pPr lvl="3"/>
             <a:r>
-              <a:rPr lang="en-US" smtClean="0"/>
+              <a:rPr lang="en-US"/>
               <a:t>Fourth level</a:t>
             </a:r>
           </a:p>
           <a:p>
             <a:pPr lvl="4"/>
             <a:r>
-              <a:rPr lang="en-US" smtClean="0"/>
+              <a:rPr lang="en-US"/>
               <a:t>Fifth level</a:t>
             </a:r>
             <a:endParaRPr lang="en-US" dirty="0"/>
@@ -1856,35 +1870,35 @@
           <a:p>
             <a:pPr lvl="0"/>
             <a:r>
-              <a:rPr lang="en-US" smtClean="0"/>
+              <a:rPr lang="en-US"/>
               <a:t>Click to edit Master text styles</a:t>
             </a:r>
           </a:p>
           <a:p>
             <a:pPr lvl="1"/>
             <a:r>
-              <a:rPr lang="en-US" smtClean="0"/>
+              <a:rPr lang="en-US"/>
               <a:t>Second level</a:t>
             </a:r>
           </a:p>
           <a:p>
             <a:pPr lvl="2"/>
             <a:r>
-              <a:rPr lang="en-US" smtClean="0"/>
+              <a:rPr lang="en-US"/>
               <a:t>Third level</a:t>
             </a:r>
           </a:p>
           <a:p>
             <a:pPr lvl="3"/>
             <a:r>
-              <a:rPr lang="en-US" smtClean="0"/>
+              <a:rPr lang="en-US"/>
               <a:t>Fourth level</a:t>
             </a:r>
           </a:p>
           <a:p>
             <a:pPr lvl="4"/>
             <a:r>
-              <a:rPr lang="en-US" smtClean="0"/>
+              <a:rPr lang="en-US"/>
               <a:t>Fifth level</a:t>
             </a:r>
             <a:endParaRPr lang="en-US" dirty="0"/>
@@ -1909,7 +1923,7 @@
             <a:fld id="{113A18F4-33C3-445B-924C-31108C51719C}" type="datetime4">
               <a:rPr lang="en-US" smtClean="0"/>
               <a:pPr/>
-              <a:t>September 27, 2016</a:t>
+              <a:t>September 28, 2016</a:t>
             </a:fld>
             <a:endParaRPr lang="en-US"/>
           </a:p>
@@ -1974,10 +1988,9 @@
           <a:lstStyle/>
           <a:p>
             <a:r>
-              <a:rPr lang="en-US" smtClean="0"/>
+              <a:rPr lang="en-US"/>
               <a:t>Click to edit Master title style</a:t>
             </a:r>
-            <a:endParaRPr lang="en-US"/>
           </a:p>
         </p:txBody>
       </p:sp>
@@ -2026,10 +2039,9 @@
           </a:lstStyle>
           <a:p>
             <a:r>
-              <a:rPr lang="en-US" smtClean="0"/>
+              <a:rPr lang="en-US"/>
               <a:t>Click to edit Master title style</a:t>
             </a:r>
-            <a:endParaRPr lang="en-US"/>
           </a:p>
         </p:txBody>
       </p:sp>
@@ -2116,7 +2128,7 @@
               <a:buNone/>
             </a:pPr>
             <a:r>
-              <a:rPr lang="en-US" smtClean="0"/>
+              <a:rPr lang="en-US"/>
               <a:t>Click to edit Master text styles</a:t>
             </a:r>
           </a:p>
@@ -2172,35 +2184,35 @@
           <a:p>
             <a:pPr lvl="0"/>
             <a:r>
-              <a:rPr lang="en-US" smtClean="0"/>
+              <a:rPr lang="en-US"/>
               <a:t>Click to edit Master text styles</a:t>
             </a:r>
           </a:p>
           <a:p>
             <a:pPr lvl="1"/>
             <a:r>
-              <a:rPr lang="en-US" smtClean="0"/>
+              <a:rPr lang="en-US"/>
               <a:t>Second level</a:t>
             </a:r>
           </a:p>
           <a:p>
             <a:pPr lvl="2"/>
             <a:r>
-              <a:rPr lang="en-US" smtClean="0"/>
+              <a:rPr lang="en-US"/>
               <a:t>Third level</a:t>
             </a:r>
           </a:p>
           <a:p>
             <a:pPr lvl="3"/>
             <a:r>
-              <a:rPr lang="en-US" smtClean="0"/>
+              <a:rPr lang="en-US"/>
               <a:t>Fourth level</a:t>
             </a:r>
           </a:p>
           <a:p>
             <a:pPr lvl="4"/>
             <a:r>
-              <a:rPr lang="en-US" smtClean="0"/>
+              <a:rPr lang="en-US"/>
               <a:t>Fifth level</a:t>
             </a:r>
             <a:endParaRPr lang="en-US" dirty="0"/>
@@ -2290,7 +2302,7 @@
               <a:buNone/>
             </a:pPr>
             <a:r>
-              <a:rPr lang="en-US" smtClean="0"/>
+              <a:rPr lang="en-US"/>
               <a:t>Click to edit Master text styles</a:t>
             </a:r>
           </a:p>
@@ -2346,35 +2358,35 @@
           <a:p>
             <a:pPr lvl="0"/>
             <a:r>
-              <a:rPr lang="en-US" smtClean="0"/>
+              <a:rPr lang="en-US"/>
               <a:t>Click to edit Master text styles</a:t>
             </a:r>
           </a:p>
           <a:p>
             <a:pPr lvl="1"/>
             <a:r>
-              <a:rPr lang="en-US" smtClean="0"/>
+              <a:rPr lang="en-US"/>
               <a:t>Second level</a:t>
             </a:r>
           </a:p>
           <a:p>
             <a:pPr lvl="2"/>
             <a:r>
-              <a:rPr lang="en-US" smtClean="0"/>
+              <a:rPr lang="en-US"/>
               <a:t>Third level</a:t>
             </a:r>
           </a:p>
           <a:p>
             <a:pPr lvl="3"/>
             <a:r>
-              <a:rPr lang="en-US" smtClean="0"/>
+              <a:rPr lang="en-US"/>
               <a:t>Fourth level</a:t>
             </a:r>
           </a:p>
           <a:p>
             <a:pPr lvl="4"/>
             <a:r>
-              <a:rPr lang="en-US" smtClean="0"/>
+              <a:rPr lang="en-US"/>
               <a:t>Fifth level</a:t>
             </a:r>
             <a:endParaRPr lang="en-US" dirty="0"/>
@@ -2399,7 +2411,7 @@
             <a:fld id="{3AF7543A-E259-478F-9E0D-57BA40E442B7}" type="datetime4">
               <a:rPr lang="en-US" smtClean="0"/>
               <a:pPr/>
-              <a:t>September 27, 2016</a:t>
+              <a:t>September 28, 2016</a:t>
             </a:fld>
             <a:endParaRPr lang="en-US"/>
           </a:p>
@@ -2489,10 +2501,9 @@
           <a:lstStyle/>
           <a:p>
             <a:r>
-              <a:rPr lang="en-US" smtClean="0"/>
+              <a:rPr lang="en-US"/>
               <a:t>Click to edit Master title style</a:t>
             </a:r>
-            <a:endParaRPr lang="en-US"/>
           </a:p>
         </p:txBody>
       </p:sp>
@@ -2514,7 +2525,7 @@
             <a:fld id="{1EFB012D-77A1-44B0-BB26-329BA1EE55C9}" type="datetime4">
               <a:rPr lang="en-US" smtClean="0"/>
               <a:pPr/>
-              <a:t>September 27, 2016</a:t>
+              <a:t>September 28, 2016</a:t>
             </a:fld>
             <a:endParaRPr lang="en-US"/>
           </a:p>
@@ -2606,7 +2617,7 @@
             <a:fld id="{94B7499E-3031-413E-B01E-B94970708CAA}" type="datetime4">
               <a:rPr lang="en-US" smtClean="0"/>
               <a:pPr/>
-              <a:t>September 27, 2016</a:t>
+              <a:t>September 28, 2016</a:t>
             </a:fld>
             <a:endParaRPr lang="en-US"/>
           </a:p>
@@ -2836,7 +2847,7 @@
               <a:defRPr/>
             </a:pPr>
             <a:r>
-              <a:rPr lang="en-US" smtClean="0"/>
+              <a:rPr lang="en-US"/>
               <a:t>Click to edit Master title style</a:t>
             </a:r>
             <a:endParaRPr lang="en-US" dirty="0"/>
@@ -2893,35 +2904,35 @@
           <a:p>
             <a:pPr lvl="0"/>
             <a:r>
-              <a:rPr lang="en-US" smtClean="0"/>
+              <a:rPr lang="en-US"/>
               <a:t>Click to edit Master text styles</a:t>
             </a:r>
           </a:p>
           <a:p>
             <a:pPr lvl="1"/>
             <a:r>
-              <a:rPr lang="en-US" smtClean="0"/>
+              <a:rPr lang="en-US"/>
               <a:t>Second level</a:t>
             </a:r>
           </a:p>
           <a:p>
             <a:pPr lvl="2"/>
             <a:r>
-              <a:rPr lang="en-US" smtClean="0"/>
+              <a:rPr lang="en-US"/>
               <a:t>Third level</a:t>
             </a:r>
           </a:p>
           <a:p>
             <a:pPr lvl="3"/>
             <a:r>
-              <a:rPr lang="en-US" smtClean="0"/>
+              <a:rPr lang="en-US"/>
               <a:t>Fourth level</a:t>
             </a:r>
           </a:p>
           <a:p>
             <a:pPr lvl="4"/>
             <a:r>
-              <a:rPr lang="en-US" smtClean="0"/>
+              <a:rPr lang="en-US"/>
               <a:t>Fifth level</a:t>
             </a:r>
             <a:endParaRPr lang="en-US" dirty="0"/>
@@ -3014,7 +3025,7 @@
               <a:defRPr/>
             </a:pPr>
             <a:r>
-              <a:rPr lang="en-US" smtClean="0"/>
+              <a:rPr lang="en-US"/>
               <a:t>Click to edit Master text styles</a:t>
             </a:r>
           </a:p>
@@ -3038,7 +3049,7 @@
             <a:fld id="{DC7EAB0C-2220-4D0E-A0DD-DB7FA0F742F4}" type="datetime4">
               <a:rPr lang="en-US" smtClean="0"/>
               <a:pPr/>
-              <a:t>September 27, 2016</a:t>
+              <a:t>September 28, 2016</a:t>
             </a:fld>
             <a:endParaRPr lang="en-US"/>
           </a:p>
@@ -3475,10 +3486,9 @@
           </a:lstStyle>
           <a:p>
             <a:r>
-              <a:rPr lang="en-US" dirty="0" smtClean="0"/>
+              <a:rPr lang="en-US" dirty="0"/>
               <a:t>Click to edit Master title style</a:t>
             </a:r>
-            <a:endParaRPr lang="en-US" dirty="0"/>
           </a:p>
         </p:txBody>
       </p:sp>
@@ -3545,7 +3555,7 @@
           <a:p>
             <a:pPr lvl="0"/>
             <a:r>
-              <a:rPr lang="en-US" smtClean="0"/>
+              <a:rPr lang="en-US"/>
               <a:t>Click to edit Master text styles</a:t>
             </a:r>
           </a:p>
@@ -3569,7 +3579,7 @@
             <a:fld id="{E3416D63-31BF-4B94-B6C5-E20B2C63F515}" type="datetime4">
               <a:rPr lang="en-US" smtClean="0"/>
               <a:pPr/>
-              <a:t>September 27, 2016</a:t>
+              <a:t>September 28, 2016</a:t>
             </a:fld>
             <a:endParaRPr lang="en-US"/>
           </a:p>
@@ -4308,7 +4318,7 @@
           <a:lstStyle/>
           <a:p>
             <a:r>
-              <a:rPr lang="en-US" smtClean="0"/>
+              <a:rPr lang="en-US"/>
               <a:t>Click to edit Master title style</a:t>
             </a:r>
             <a:endParaRPr lang="en-US" dirty="0"/>
@@ -4342,35 +4352,35 @@
           <a:p>
             <a:pPr lvl="0"/>
             <a:r>
-              <a:rPr lang="en-US" smtClean="0"/>
+              <a:rPr lang="en-US"/>
               <a:t>Click to edit Master text styles</a:t>
             </a:r>
           </a:p>
           <a:p>
             <a:pPr lvl="1"/>
             <a:r>
-              <a:rPr lang="en-US" smtClean="0"/>
+              <a:rPr lang="en-US"/>
               <a:t>Second level</a:t>
             </a:r>
           </a:p>
           <a:p>
             <a:pPr lvl="2"/>
             <a:r>
-              <a:rPr lang="en-US" smtClean="0"/>
+              <a:rPr lang="en-US"/>
               <a:t>Third level</a:t>
             </a:r>
           </a:p>
           <a:p>
             <a:pPr lvl="3"/>
             <a:r>
-              <a:rPr lang="en-US" smtClean="0"/>
+              <a:rPr lang="en-US"/>
               <a:t>Fourth level</a:t>
             </a:r>
           </a:p>
           <a:p>
             <a:pPr lvl="4"/>
             <a:r>
-              <a:rPr lang="en-US" smtClean="0"/>
+              <a:rPr lang="en-US"/>
               <a:t>Fifth level</a:t>
             </a:r>
             <a:endParaRPr lang="en-US" dirty="0"/>
@@ -4411,7 +4421,7 @@
             <a:fld id="{62B1B13E-D5AF-485E-81A1-82A140076526}" type="datetime4">
               <a:rPr lang="en-US" smtClean="0"/>
               <a:pPr/>
-              <a:t>September 27, 2016</a:t>
+              <a:t>September 28, 2016</a:t>
             </a:fld>
             <a:endParaRPr lang="en-US" dirty="0"/>
           </a:p>
@@ -4826,10 +4836,9 @@
           <a:lstStyle/>
           <a:p>
             <a:r>
-              <a:rPr lang="en-US" sz="6000" dirty="0" smtClean="0"/>
+              <a:rPr lang="en-US" sz="6000" dirty="0"/>
               <a:t>V-Menu</a:t>
             </a:r>
-            <a:endParaRPr lang="en-US" sz="6000" dirty="0"/>
           </a:p>
         </p:txBody>
       </p:sp>
@@ -4851,10 +4860,9 @@
           <a:lstStyle/>
           <a:p>
             <a:r>
-              <a:rPr lang="en-US" sz="1600" b="1" dirty="0" smtClean="0"/>
+              <a:rPr lang="en-US" sz="1600" b="1" dirty="0"/>
               <a:t>Team Two</a:t>
             </a:r>
-            <a:endParaRPr lang="en-US" sz="1600" b="1" dirty="0"/>
           </a:p>
         </p:txBody>
       </p:sp>
@@ -4868,13 +4876,6 @@
   <p:clrMapOvr>
     <a:masterClrMapping/>
   </p:clrMapOvr>
-  <p:timing>
-    <p:tnLst>
-      <p:par>
-        <p:cTn xmlns:p14="http://schemas.microsoft.com/office/powerpoint/2010/main" id="1" dur="indefinite" restart="never" nodeType="tmRoot"/>
-      </p:par>
-    </p:tnLst>
-  </p:timing>
 </p:sld>
 </file>
 
@@ -4911,10 +4912,9 @@
           <a:lstStyle/>
           <a:p>
             <a:r>
-              <a:rPr lang="en-US" dirty="0" smtClean="0"/>
+              <a:rPr lang="en-US" dirty="0"/>
               <a:t>TEAM Members</a:t>
             </a:r>
-            <a:endParaRPr lang="en-US" dirty="0"/>
           </a:p>
         </p:txBody>
       </p:sp>
@@ -4939,42 +4939,41 @@
           <a:lstStyle/>
           <a:p>
             <a:r>
-              <a:rPr lang="en-US" dirty="0" smtClean="0"/>
+              <a:rPr lang="en-US" dirty="0"/>
               <a:t>Matthew </a:t>
             </a:r>
             <a:r>
-              <a:rPr lang="en-US" dirty="0" err="1" smtClean="0"/>
+              <a:rPr lang="en-US" dirty="0" err="1"/>
               <a:t>Boyette</a:t>
             </a:r>
             <a:r>
-              <a:rPr lang="en-US" dirty="0" smtClean="0"/>
+              <a:rPr lang="en-US" dirty="0"/>
               <a:t> – Lead Developer</a:t>
             </a:r>
           </a:p>
           <a:p>
             <a:r>
-              <a:rPr lang="en-US" dirty="0" smtClean="0"/>
+              <a:rPr lang="en-US" dirty="0"/>
               <a:t>David Hughes – Lead Designer</a:t>
             </a:r>
           </a:p>
           <a:p>
             <a:r>
-              <a:rPr lang="en-US" dirty="0" smtClean="0"/>
+              <a:rPr lang="en-US" dirty="0"/>
               <a:t>William Mejia – Developer </a:t>
             </a:r>
           </a:p>
           <a:p>
             <a:r>
-              <a:rPr lang="en-US" dirty="0" smtClean="0"/>
+              <a:rPr lang="en-US" dirty="0"/>
               <a:t>Demetrius Myers – Developer </a:t>
             </a:r>
           </a:p>
           <a:p>
             <a:r>
-              <a:rPr lang="en-US" dirty="0" smtClean="0"/>
+              <a:rPr lang="en-US" dirty="0"/>
               <a:t>Slaven Popadic – Developer </a:t>
             </a:r>
-            <a:endParaRPr lang="en-US" dirty="0"/>
           </a:p>
         </p:txBody>
       </p:sp>
@@ -4987,7 +4986,7 @@
           <p:nvPr/>
         </p:nvPicPr>
         <p:blipFill>
-          <a:blip r:embed="rId2" cstate="print">
+          <a:blip r:embed="rId2" cstate="email">
             <a:extLst>
               <a:ext uri="{28A0092B-C50C-407E-A947-70E740481C1C}">
                 <a14:useLocalDpi xmlns:a14="http://schemas.microsoft.com/office/drawing/2010/main" val="0"/>
@@ -5019,13 +5018,6 @@
   <p:clrMapOvr>
     <a:masterClrMapping/>
   </p:clrMapOvr>
-  <p:timing>
-    <p:tnLst>
-      <p:par>
-        <p:cTn xmlns:p14="http://schemas.microsoft.com/office/powerpoint/2010/main" id="1" dur="indefinite" restart="never" nodeType="tmRoot"/>
-      </p:par>
-    </p:tnLst>
-  </p:timing>
 </p:sld>
 </file>
 
@@ -5061,11 +5053,120 @@
           <a:bodyPr/>
           <a:lstStyle/>
           <a:p>
-            <a:r>
-              <a:rPr lang="en-US" dirty="0" smtClean="0"/>
+            <a:pPr algn="ctr"/>
+            <a:endParaRPr lang="en-US" dirty="0"/>
+          </a:p>
+        </p:txBody>
+      </p:sp>
+      <p:pic>
+        <p:nvPicPr>
+          <p:cNvPr id="4" name="Content Placeholder 3" descr="_waitress.jpg"/>
+          <p:cNvPicPr>
+            <a:picLocks noChangeAspect="1"/>
+          </p:cNvPicPr>
+          <p:nvPr/>
+        </p:nvPicPr>
+        <p:blipFill>
+          <a:blip r:embed="rId2" cstate="email">
+            <a:extLst>
+              <a:ext uri="{28A0092B-C50C-407E-A947-70E740481C1C}">
+                <a14:useLocalDpi xmlns:a14="http://schemas.microsoft.com/office/drawing/2010/main" val="0"/>
+              </a:ext>
+            </a:extLst>
+          </a:blip>
+          <a:srcRect l="-41292" r="-41292"/>
+          <a:stretch>
+            <a:fillRect/>
+          </a:stretch>
+        </p:blipFill>
+        <p:spPr>
+          <a:xfrm>
+            <a:off x="2459578" y="1871003"/>
+            <a:ext cx="6684421" cy="3181378"/>
+          </a:xfrm>
+          <a:prstGeom prst="rect">
+            <a:avLst/>
+          </a:prstGeom>
+        </p:spPr>
+      </p:pic>
+      <p:pic>
+        <p:nvPicPr>
+          <p:cNvPr id="6" name="Content Placeholder 5"/>
+          <p:cNvPicPr>
+            <a:picLocks noGrp="1" noChangeAspect="1"/>
+          </p:cNvPicPr>
+          <p:nvPr>
+            <p:ph idx="1"/>
+          </p:nvPr>
+        </p:nvPicPr>
+        <p:blipFill>
+          <a:blip r:embed="rId3" cstate="email">
+            <a:extLst>
+              <a:ext uri="{28A0092B-C50C-407E-A947-70E740481C1C}">
+                <a14:useLocalDpi xmlns:a14="http://schemas.microsoft.com/office/drawing/2010/main" val="0"/>
+              </a:ext>
+            </a:extLst>
+          </a:blip>
+          <a:stretch>
+            <a:fillRect/>
+          </a:stretch>
+        </p:blipFill>
+        <p:spPr>
+          <a:xfrm>
+            <a:off x="822960" y="914400"/>
+            <a:ext cx="3104832" cy="3610805"/>
+          </a:xfrm>
+        </p:spPr>
+      </p:pic>
+    </p:spTree>
+    <p:extLst>
+      <p:ext uri="{BB962C8B-B14F-4D97-AF65-F5344CB8AC3E}">
+        <p14:creationId xmlns:p14="http://schemas.microsoft.com/office/powerpoint/2010/main" val="2810907593"/>
+      </p:ext>
+    </p:extLst>
+  </p:cSld>
+  <p:clrMapOvr>
+    <a:masterClrMapping/>
+  </p:clrMapOvr>
+</p:sld>
+</file>
+
+<file path=ppt/slides/slide4.xml><?xml version="1.0" encoding="utf-8"?>
+<p:sld xmlns:a="http://schemas.openxmlformats.org/drawingml/2006/main" xmlns:r="http://schemas.openxmlformats.org/officeDocument/2006/relationships" xmlns:p="http://schemas.openxmlformats.org/presentationml/2006/main">
+  <p:cSld>
+    <p:spTree>
+      <p:nvGrpSpPr>
+        <p:cNvPr id="1" name=""/>
+        <p:cNvGrpSpPr/>
+        <p:nvPr/>
+      </p:nvGrpSpPr>
+      <p:grpSpPr>
+        <a:xfrm>
+          <a:off x="0" y="0"/>
+          <a:ext cx="0" cy="0"/>
+          <a:chOff x="0" y="0"/>
+          <a:chExt cx="0" cy="0"/>
+        </a:xfrm>
+      </p:grpSpPr>
+      <p:sp>
+        <p:nvSpPr>
+          <p:cNvPr id="2" name="Title 1"/>
+          <p:cNvSpPr>
+            <a:spLocks noGrp="1"/>
+          </p:cNvSpPr>
+          <p:nvPr>
+            <p:ph type="title"/>
+          </p:nvPr>
+        </p:nvSpPr>
+        <p:spPr/>
+        <p:txBody>
+          <a:bodyPr/>
+          <a:lstStyle/>
+          <a:p>
+            <a:r>
+              <a:rPr lang="en-US" dirty="0"/>
               <a:t>Why v-menu</a:t>
             </a:r>
-            <a:endParaRPr lang="en-US" dirty="0"/>
           </a:p>
         </p:txBody>
       </p:sp>
@@ -5091,7 +5192,7 @@
               <a:buChar char="•"/>
             </a:pPr>
             <a:r>
-              <a:rPr lang="en-US" sz="2400" dirty="0" smtClean="0"/>
+              <a:rPr lang="en-US" sz="2400" dirty="0"/>
               <a:t>Convenience </a:t>
             </a:r>
           </a:p>
@@ -5101,7 +5202,7 @@
               <a:buChar char="•"/>
             </a:pPr>
             <a:r>
-              <a:rPr lang="en-US" sz="2400" dirty="0" smtClean="0"/>
+              <a:rPr lang="en-US" sz="2400" dirty="0"/>
               <a:t>Speed</a:t>
             </a:r>
           </a:p>
@@ -5111,7 +5212,7 @@
               <a:buChar char="•"/>
             </a:pPr>
             <a:r>
-              <a:rPr lang="en-US" sz="2400" dirty="0" smtClean="0"/>
+              <a:rPr lang="en-US" sz="2400" dirty="0"/>
               <a:t>Control</a:t>
             </a:r>
           </a:p>
@@ -5121,7 +5222,7 @@
               <a:buChar char="•"/>
             </a:pPr>
             <a:r>
-              <a:rPr lang="en-US" sz="2400" dirty="0" smtClean="0"/>
+              <a:rPr lang="en-US" sz="2400" dirty="0"/>
               <a:t>Customer Satisfaction</a:t>
             </a:r>
           </a:p>
@@ -5131,7 +5232,7 @@
               <a:buChar char="•"/>
             </a:pPr>
             <a:r>
-              <a:rPr lang="en-US" sz="2400" dirty="0" smtClean="0"/>
+              <a:rPr lang="en-US" sz="2400" dirty="0"/>
               <a:t>Efficient</a:t>
             </a:r>
           </a:p>
@@ -5141,7 +5242,7 @@
               <a:buChar char="•"/>
             </a:pPr>
             <a:r>
-              <a:rPr lang="en-US" sz="2400" dirty="0" smtClean="0"/>
+              <a:rPr lang="en-US" sz="2400" dirty="0"/>
               <a:t>Modern </a:t>
             </a:r>
           </a:p>
@@ -5151,10 +5252,9 @@
               <a:buChar char="•"/>
             </a:pPr>
             <a:r>
-              <a:rPr lang="en-US" sz="2400" dirty="0" smtClean="0"/>
+              <a:rPr lang="en-US" sz="2400" dirty="0"/>
               <a:t>Privacy </a:t>
             </a:r>
-            <a:endParaRPr lang="en-US" sz="2400" dirty="0"/>
           </a:p>
         </p:txBody>
       </p:sp>
@@ -5167,7 +5267,7 @@
           <p:nvPr/>
         </p:nvPicPr>
         <p:blipFill>
-          <a:blip r:embed="rId2">
+          <a:blip r:embed="rId2" cstate="email">
             <a:extLst>
               <a:ext uri="{28A0092B-C50C-407E-A947-70E740481C1C}">
                 <a14:useLocalDpi xmlns:a14="http://schemas.microsoft.com/office/drawing/2010/main" val="0"/>
@@ -5199,17 +5299,10 @@
   <p:clrMapOvr>
     <a:masterClrMapping/>
   </p:clrMapOvr>
-  <p:timing>
-    <p:tnLst>
-      <p:par>
-        <p:cTn xmlns:p14="http://schemas.microsoft.com/office/powerpoint/2010/main" id="1" dur="indefinite" restart="never" nodeType="tmRoot"/>
-      </p:par>
-    </p:tnLst>
-  </p:timing>
 </p:sld>
 </file>
 
-<file path=ppt/slides/slide4.xml><?xml version="1.0" encoding="utf-8"?>
+<file path=ppt/slides/slide5.xml><?xml version="1.0" encoding="utf-8"?>
 <p:sld xmlns:a="http://schemas.openxmlformats.org/drawingml/2006/main" xmlns:r="http://schemas.openxmlformats.org/officeDocument/2006/relationships" xmlns:p="http://schemas.openxmlformats.org/presentationml/2006/main">
   <p:cSld>
     <p:spTree>
@@ -5242,10 +5335,9 @@
           <a:lstStyle/>
           <a:p>
             <a:r>
-              <a:rPr lang="en-US" dirty="0" smtClean="0"/>
+              <a:rPr lang="en-US" dirty="0"/>
               <a:t>Convenience &amp; Speed</a:t>
             </a:r>
-            <a:endParaRPr lang="en-US" dirty="0"/>
           </a:p>
         </p:txBody>
       </p:sp>
@@ -5267,46 +5359,46 @@
           <a:lstStyle/>
           <a:p>
             <a:r>
-              <a:rPr lang="en-US" sz="2000" dirty="0" smtClean="0"/>
+              <a:rPr lang="en-US" sz="2000" dirty="0"/>
               <a:t>Your order history is available to you and you can simply </a:t>
             </a:r>
           </a:p>
           <a:p>
             <a:r>
-              <a:rPr lang="en-US" sz="2000" dirty="0" smtClean="0"/>
+              <a:rPr lang="en-US" sz="2000" dirty="0"/>
               <a:t>	reorder your favorite item in a couple of clicks !!</a:t>
             </a:r>
           </a:p>
           <a:p>
-            <a:endParaRPr lang="en-US" sz="2000" dirty="0" smtClean="0"/>
-          </a:p>
-          <a:p>
-            <a:r>
-              <a:rPr lang="en-US" sz="2000" dirty="0" smtClean="0"/>
+            <a:endParaRPr lang="en-US" sz="2000" dirty="0"/>
+          </a:p>
+          <a:p>
+            <a:r>
+              <a:rPr lang="en-US" sz="2000" dirty="0"/>
               <a:t>Fast and easy </a:t>
             </a:r>
           </a:p>
           <a:p>
             <a:r>
-              <a:rPr lang="en-US" sz="2000" dirty="0" smtClean="0"/>
+              <a:rPr lang="en-US" sz="2000" dirty="0"/>
               <a:t>for</a:t>
             </a:r>
           </a:p>
           <a:p>
             <a:r>
-              <a:rPr lang="en-US" sz="2000" dirty="0" smtClean="0"/>
+              <a:rPr lang="en-US" sz="2000" dirty="0"/>
               <a:t>Customers</a:t>
             </a:r>
           </a:p>
           <a:p>
             <a:r>
-              <a:rPr lang="en-US" sz="2000" dirty="0" smtClean="0"/>
+              <a:rPr lang="en-US" sz="2000" dirty="0"/>
               <a:t>And</a:t>
             </a:r>
           </a:p>
           <a:p>
             <a:r>
-              <a:rPr lang="en-US" sz="2000" dirty="0" smtClean="0"/>
+              <a:rPr lang="en-US" sz="2000" dirty="0"/>
               <a:t>Staff</a:t>
             </a:r>
           </a:p>
@@ -5353,17 +5445,10 @@
   <p:clrMapOvr>
     <a:masterClrMapping/>
   </p:clrMapOvr>
-  <p:timing>
-    <p:tnLst>
-      <p:par>
-        <p:cTn xmlns:p14="http://schemas.microsoft.com/office/powerpoint/2010/main" id="1" dur="indefinite" restart="never" nodeType="tmRoot"/>
-      </p:par>
-    </p:tnLst>
-  </p:timing>
 </p:sld>
 </file>
 
-<file path=ppt/slides/slide5.xml><?xml version="1.0" encoding="utf-8"?>
+<file path=ppt/slides/slide6.xml><?xml version="1.0" encoding="utf-8"?>
 <p:sld xmlns:a="http://schemas.openxmlformats.org/drawingml/2006/main" xmlns:r="http://schemas.openxmlformats.org/officeDocument/2006/relationships" xmlns:p="http://schemas.openxmlformats.org/presentationml/2006/main">
   <p:cSld>
     <p:spTree>
@@ -5396,10 +5481,9 @@
           <a:lstStyle/>
           <a:p>
             <a:r>
-              <a:rPr lang="en-US" dirty="0" smtClean="0"/>
+              <a:rPr lang="en-US" dirty="0"/>
               <a:t>Control &amp; customer satisfaction</a:t>
             </a:r>
-            <a:endParaRPr lang="en-US" dirty="0"/>
           </a:p>
         </p:txBody>
       </p:sp>
@@ -5419,10 +5503,9 @@
           <a:lstStyle/>
           <a:p>
             <a:r>
-              <a:rPr lang="en-US" dirty="0" smtClean="0"/>
+              <a:rPr lang="en-US" dirty="0"/>
               <a:t>The customer is in full control of the order and ordering process </a:t>
             </a:r>
-            <a:endParaRPr lang="en-US" dirty="0"/>
           </a:p>
         </p:txBody>
       </p:sp>
@@ -5435,7 +5518,7 @@
           <p:nvPr/>
         </p:nvPicPr>
         <p:blipFill>
-          <a:blip r:embed="rId2">
+          <a:blip r:embed="rId2" cstate="email">
             <a:extLst>
               <a:ext uri="{28A0092B-C50C-407E-A947-70E740481C1C}">
                 <a14:useLocalDpi xmlns:a14="http://schemas.microsoft.com/office/drawing/2010/main" val="0"/>
@@ -5466,7 +5549,7 @@
           <p:nvPr/>
         </p:nvPicPr>
         <p:blipFill>
-          <a:blip r:embed="rId3">
+          <a:blip r:embed="rId3" cstate="email">
             <a:extLst>
               <a:ext uri="{28A0092B-C50C-407E-A947-70E740481C1C}">
                 <a14:useLocalDpi xmlns:a14="http://schemas.microsoft.com/office/drawing/2010/main" val="0"/>
@@ -5498,17 +5581,10 @@
   <p:clrMapOvr>
     <a:masterClrMapping/>
   </p:clrMapOvr>
-  <p:timing>
-    <p:tnLst>
-      <p:par>
-        <p:cTn xmlns:p14="http://schemas.microsoft.com/office/powerpoint/2010/main" id="1" dur="indefinite" restart="never" nodeType="tmRoot"/>
-      </p:par>
-    </p:tnLst>
-  </p:timing>
 </p:sld>
 </file>
 
-<file path=ppt/slides/slide6.xml><?xml version="1.0" encoding="utf-8"?>
+<file path=ppt/slides/slide7.xml><?xml version="1.0" encoding="utf-8"?>
 <p:sld xmlns:a="http://schemas.openxmlformats.org/drawingml/2006/main" xmlns:r="http://schemas.openxmlformats.org/officeDocument/2006/relationships" xmlns:p="http://schemas.openxmlformats.org/presentationml/2006/main">
   <p:cSld>
     <p:spTree>
@@ -5541,10 +5617,151 @@
           <a:lstStyle/>
           <a:p>
             <a:r>
-              <a:rPr lang="en-US" dirty="0" smtClean="0"/>
+              <a:rPr lang="en-US" dirty="0"/>
+              <a:t>TEAM Members</a:t>
+            </a:r>
+          </a:p>
+        </p:txBody>
+      </p:sp>
+      <p:sp>
+        <p:nvSpPr>
+          <p:cNvPr id="3" name="Content Placeholder 2"/>
+          <p:cNvSpPr>
+            <a:spLocks noGrp="1"/>
+          </p:cNvSpPr>
+          <p:nvPr>
+            <p:ph idx="1"/>
+          </p:nvPr>
+        </p:nvSpPr>
+        <p:spPr>
+          <a:xfrm>
+            <a:off x="822960" y="1008803"/>
+            <a:ext cx="3317097" cy="1967533"/>
+          </a:xfrm>
+        </p:spPr>
+        <p:txBody>
+          <a:bodyPr/>
+          <a:lstStyle/>
+          <a:p>
+            <a:r>
+              <a:rPr lang="en-US" dirty="0"/>
+              <a:t>Matthew </a:t>
+            </a:r>
+            <a:r>
+              <a:rPr lang="en-US" dirty="0" err="1"/>
+              <a:t>Boyette</a:t>
+            </a:r>
+            <a:r>
+              <a:rPr lang="en-US" dirty="0"/>
+              <a:t> – Lead Developer</a:t>
+            </a:r>
+          </a:p>
+          <a:p>
+            <a:r>
+              <a:rPr lang="en-US" dirty="0"/>
+              <a:t>David Hughes – Lead Designer</a:t>
+            </a:r>
+          </a:p>
+          <a:p>
+            <a:r>
+              <a:rPr lang="en-US" dirty="0"/>
+              <a:t>William Mejia – Developer </a:t>
+            </a:r>
+          </a:p>
+          <a:p>
+            <a:r>
+              <a:rPr lang="en-US" dirty="0"/>
+              <a:t>Demetrius Myers – Developer </a:t>
+            </a:r>
+          </a:p>
+          <a:p>
+            <a:r>
+              <a:rPr lang="en-US" dirty="0"/>
+              <a:t>Slaven Popadic – Developer </a:t>
+            </a:r>
+          </a:p>
+        </p:txBody>
+      </p:sp>
+      <p:pic>
+        <p:nvPicPr>
+          <p:cNvPr id="4" name="Content Placeholder 3" descr="_waitress.jpg"/>
+          <p:cNvPicPr>
+            <a:picLocks noChangeAspect="1"/>
+          </p:cNvPicPr>
+          <p:nvPr/>
+        </p:nvPicPr>
+        <p:blipFill>
+          <a:blip r:embed="rId2" cstate="email">
+            <a:extLst>
+              <a:ext uri="{28A0092B-C50C-407E-A947-70E740481C1C}">
+                <a14:useLocalDpi xmlns:a14="http://schemas.microsoft.com/office/drawing/2010/main" val="0"/>
+              </a:ext>
+            </a:extLst>
+          </a:blip>
+          <a:srcRect l="-41292" r="-41292"/>
+          <a:stretch>
+            <a:fillRect/>
+          </a:stretch>
+        </p:blipFill>
+        <p:spPr>
+          <a:xfrm>
+            <a:off x="3539294" y="2384882"/>
+            <a:ext cx="5604706" cy="2667499"/>
+          </a:xfrm>
+          <a:prstGeom prst="rect">
+            <a:avLst/>
+          </a:prstGeom>
+        </p:spPr>
+      </p:pic>
+    </p:spTree>
+    <p:extLst>
+      <p:ext uri="{BB962C8B-B14F-4D97-AF65-F5344CB8AC3E}">
+        <p14:creationId xmlns:p14="http://schemas.microsoft.com/office/powerpoint/2010/main" val="1008026232"/>
+      </p:ext>
+    </p:extLst>
+  </p:cSld>
+  <p:clrMapOvr>
+    <a:masterClrMapping/>
+  </p:clrMapOvr>
+</p:sld>
+</file>
+
+<file path=ppt/slides/slide8.xml><?xml version="1.0" encoding="utf-8"?>
+<p:sld xmlns:a="http://schemas.openxmlformats.org/drawingml/2006/main" xmlns:r="http://schemas.openxmlformats.org/officeDocument/2006/relationships" xmlns:p="http://schemas.openxmlformats.org/presentationml/2006/main">
+  <p:cSld>
+    <p:spTree>
+      <p:nvGrpSpPr>
+        <p:cNvPr id="1" name=""/>
+        <p:cNvGrpSpPr/>
+        <p:nvPr/>
+      </p:nvGrpSpPr>
+      <p:grpSpPr>
+        <a:xfrm>
+          <a:off x="0" y="0"/>
+          <a:ext cx="0" cy="0"/>
+          <a:chOff x="0" y="0"/>
+          <a:chExt cx="0" cy="0"/>
+        </a:xfrm>
+      </p:grpSpPr>
+      <p:sp>
+        <p:nvSpPr>
+          <p:cNvPr id="2" name="Title 1"/>
+          <p:cNvSpPr>
+            <a:spLocks noGrp="1"/>
+          </p:cNvSpPr>
+          <p:nvPr>
+            <p:ph type="title"/>
+          </p:nvPr>
+        </p:nvSpPr>
+        <p:spPr/>
+        <p:txBody>
+          <a:bodyPr/>
+          <a:lstStyle/>
+          <a:p>
+            <a:r>
+              <a:rPr lang="en-US" dirty="0"/>
               <a:t>Efficient &amp; modern</a:t>
             </a:r>
-            <a:endParaRPr lang="en-US" dirty="0"/>
           </a:p>
         </p:txBody>
       </p:sp>
@@ -5566,16 +5783,15 @@
           <a:lstStyle/>
           <a:p>
             <a:r>
-              <a:rPr lang="en-US" sz="1800" dirty="0" smtClean="0"/>
+              <a:rPr lang="en-US" sz="1800" dirty="0"/>
               <a:t>A system that is able to move efficiently with the times.</a:t>
             </a:r>
           </a:p>
           <a:p>
             <a:r>
-              <a:rPr lang="en-US" sz="1800" dirty="0" smtClean="0"/>
+              <a:rPr lang="en-US" sz="1800" dirty="0"/>
               <a:t>Drone servers?</a:t>
             </a:r>
-            <a:endParaRPr lang="en-US" sz="1800" dirty="0"/>
           </a:p>
         </p:txBody>
       </p:sp>
@@ -5651,13 +5867,6 @@
   <p:clrMapOvr>
     <a:masterClrMapping/>
   </p:clrMapOvr>
-  <p:timing>
-    <p:tnLst>
-      <p:par>
-        <p:cTn xmlns:p14="http://schemas.microsoft.com/office/powerpoint/2010/main" id="1" dur="indefinite" restart="never" nodeType="tmRoot"/>
-      </p:par>
-    </p:tnLst>
-  </p:timing>
 </p:sld>
 </file>
 

</xml_diff>